<commit_message>
Profilensembleposter ein wenig Text
</commit_message>
<xml_diff>
--- a/poster/lex2018_poster_Profilensembles.pptx
+++ b/poster/lex2018_poster_Profilensembles.pptx
@@ -295,7 +295,7 @@
               <a:pPr>
                 <a:defRPr/>
               </a:pPr>
-              <a:t>06.09.18</a:t>
+              <a:t>07.09.18</a:t>
             </a:fld>
             <a:endParaRPr lang="de-DE"/>
           </a:p>
@@ -1911,7 +1911,7 @@
         </p:blipFill>
         <p:spPr>
           <a:xfrm>
-            <a:off x="22704731" y="8400105"/>
+            <a:off x="23113333" y="11275753"/>
             <a:ext cx="3863159" cy="5664449"/>
           </a:xfrm>
           <a:prstGeom prst="rect">
@@ -1940,7 +1940,7 @@
         </p:blipFill>
         <p:spPr>
           <a:xfrm>
-            <a:off x="18205412" y="8400105"/>
+            <a:off x="18614014" y="11275753"/>
             <a:ext cx="4549803" cy="5664449"/>
           </a:xfrm>
           <a:prstGeom prst="rect">
@@ -1958,8 +1958,8 @@
         </p:nvSpPr>
         <p:spPr bwMode="auto">
           <a:xfrm>
-            <a:off x="1925018" y="33059689"/>
-            <a:ext cx="17929032" cy="1015600"/>
+            <a:off x="1835346" y="29164863"/>
+            <a:ext cx="15101823" cy="1323377"/>
           </a:xfrm>
           <a:prstGeom prst="rect">
             <a:avLst/>
@@ -2896,20 +2896,12 @@
               </a:lnSpc>
             </a:pPr>
             <a:r>
-              <a:rPr lang="de-DE" sz="6600" b="1">
+              <a:rPr lang="de-DE" sz="6600" b="1" dirty="0">
                 <a:solidFill>
                   <a:schemeClr val="tx1"/>
                 </a:solidFill>
               </a:rPr>
-              <a:t>Wie </a:t>
-            </a:r>
-            <a:r>
-              <a:rPr lang="de-DE" sz="6600" b="1" dirty="0">
-                <a:solidFill>
-                  <a:schemeClr val="tx1"/>
-                </a:solidFill>
-              </a:rPr>
-              <a:t>viel Zufall steckt im Ergebnis eines </a:t>
+              <a:t>Wie viel Zufall steckt im Ergebnis eines </a:t>
             </a:r>
           </a:p>
           <a:p>
@@ -3578,9 +3570,233 @@
           </a:p>
         </p:txBody>
       </p:sp>
+      <p:sp>
+        <p:nvSpPr>
+          <p:cNvPr id="8" name="Textfeld 7"/>
+          <p:cNvSpPr txBox="1"/>
+          <p:nvPr/>
+        </p:nvSpPr>
+        <p:spPr>
+          <a:xfrm>
+            <a:off x="19611002" y="14050266"/>
+            <a:ext cx="1277914" cy="492443"/>
+          </a:xfrm>
+          <a:prstGeom prst="rect">
+            <a:avLst/>
+          </a:prstGeom>
+          <a:noFill/>
+        </p:spPr>
+        <p:txBody>
+          <a:bodyPr wrap="none" rtlCol="0">
+            <a:spAutoFit/>
+          </a:bodyPr>
+          <a:lstStyle/>
+          <a:p>
+            <a:r>
+              <a:rPr lang="de-DE" dirty="0" err="1" smtClean="0"/>
+              <a:t>Helikite</a:t>
+            </a:r>
+            <a:endParaRPr lang="de-DE" dirty="0"/>
+          </a:p>
+        </p:txBody>
+      </p:sp>
+      <p:sp>
+        <p:nvSpPr>
+          <p:cNvPr id="30" name="Textfeld 29"/>
+          <p:cNvSpPr txBox="1"/>
+          <p:nvPr/>
+        </p:nvSpPr>
+        <p:spPr>
+          <a:xfrm>
+            <a:off x="24225052" y="14542709"/>
+            <a:ext cx="1967205" cy="492443"/>
+          </a:xfrm>
+          <a:prstGeom prst="rect">
+            <a:avLst/>
+          </a:prstGeom>
+          <a:noFill/>
+        </p:spPr>
+        <p:txBody>
+          <a:bodyPr wrap="none" rtlCol="0">
+            <a:spAutoFit/>
+          </a:bodyPr>
+          <a:lstStyle/>
+          <a:p>
+            <a:r>
+              <a:rPr lang="de-DE" dirty="0" smtClean="0"/>
+              <a:t>Radiosonde</a:t>
+            </a:r>
+            <a:endParaRPr lang="de-DE" dirty="0"/>
+          </a:p>
+        </p:txBody>
+      </p:sp>
+      <p:sp>
+        <p:nvSpPr>
+          <p:cNvPr id="14" name="Rechteck 13"/>
+          <p:cNvSpPr/>
+          <p:nvPr/>
+        </p:nvSpPr>
+        <p:spPr bwMode="auto">
+          <a:xfrm>
+            <a:off x="1220434" y="10738742"/>
+            <a:ext cx="26711150" cy="8138906"/>
+          </a:xfrm>
+          <a:prstGeom prst="rect">
+            <a:avLst/>
+          </a:prstGeom>
+          <a:noFill/>
+          <a:ln w="98425" cap="flat" cmpd="sng" algn="ctr">
+            <a:solidFill>
+              <a:srgbClr val="CB1028"/>
+            </a:solidFill>
+            <a:prstDash val="solid"/>
+            <a:round/>
+            <a:headEnd type="none" w="med" len="med"/>
+            <a:tailEnd type="none" w="med" len="med"/>
+          </a:ln>
+          <a:effectLst/>
+          <a:extLst>
+            <a:ext uri="{909E8E84-426E-40DD-AFC4-6F175D3DCCD1}">
+              <a14:hiddenFill xmlns:a14="http://schemas.microsoft.com/office/drawing/2010/main">
+                <a:solidFill>
+                  <a:schemeClr val="accent1"/>
+                </a:solidFill>
+              </a14:hiddenFill>
+            </a:ext>
+            <a:ext uri="{AF507438-7753-43E0-B8FC-AC1667EBCBE1}">
+              <a14:hiddenEffects xmlns:a14="http://schemas.microsoft.com/office/drawing/2010/main">
+                <a:effectLst>
+                  <a:outerShdw dist="35921" dir="2700000" algn="ctr" rotWithShape="0">
+                    <a:schemeClr val="bg2"/>
+                  </a:outerShdw>
+                </a:effectLst>
+              </a14:hiddenEffects>
+            </a:ext>
+          </a:extLst>
+        </p:spPr>
+        <p:txBody>
+          <a:bodyPr vert="horz" wrap="square" lIns="90000" tIns="46800" rIns="90000" bIns="46800" numCol="1" rtlCol="0" anchor="t" anchorCtr="0" compatLnSpc="1">
+            <a:prstTxWarp prst="textNoShape">
+              <a:avLst/>
+            </a:prstTxWarp>
+          </a:bodyPr>
+          <a:lstStyle/>
+          <a:p>
+            <a:pPr marL="0" marR="0" indent="0" algn="l" defTabSz="914400" rtl="0" eaLnBrk="0" fontAlgn="base" latinLnBrk="0" hangingPunct="0">
+              <a:lnSpc>
+                <a:spcPct val="100000"/>
+              </a:lnSpc>
+              <a:spcBef>
+                <a:spcPct val="0"/>
+              </a:spcBef>
+              <a:spcAft>
+                <a:spcPct val="0"/>
+              </a:spcAft>
+              <a:buClrTx/>
+              <a:buSzTx/>
+              <a:buFontTx/>
+              <a:buNone/>
+              <a:tabLst/>
+            </a:pPr>
+            <a:endParaRPr kumimoji="0" lang="de-DE" sz="2400" b="0" i="0" u="none" strike="noStrike" cap="none" normalizeH="0" baseline="0" smtClean="0">
+              <a:ln>
+                <a:noFill/>
+              </a:ln>
+              <a:solidFill>
+                <a:srgbClr val="000000"/>
+              </a:solidFill>
+              <a:effectLst/>
+              <a:latin typeface="Arial" charset="0"/>
+              <a:ea typeface="ＭＳ Ｐゴシック" pitchFamily="124" charset="-128"/>
+            </a:endParaRPr>
+          </a:p>
+        </p:txBody>
+      </p:sp>
+      <p:sp>
+        <p:nvSpPr>
+          <p:cNvPr id="32" name="Rechteck 31"/>
+          <p:cNvSpPr/>
+          <p:nvPr/>
+        </p:nvSpPr>
+        <p:spPr bwMode="auto">
+          <a:xfrm>
+            <a:off x="1220434" y="19273692"/>
+            <a:ext cx="26806603" cy="11133029"/>
+          </a:xfrm>
+          <a:prstGeom prst="rect">
+            <a:avLst/>
+          </a:prstGeom>
+          <a:noFill/>
+          <a:ln w="98425" cap="flat" cmpd="sng" algn="ctr">
+            <a:solidFill>
+              <a:srgbClr val="CB1028"/>
+            </a:solidFill>
+            <a:prstDash val="solid"/>
+            <a:round/>
+            <a:headEnd type="none" w="med" len="med"/>
+            <a:tailEnd type="none" w="med" len="med"/>
+          </a:ln>
+          <a:effectLst/>
+          <a:extLst>
+            <a:ext uri="{909E8E84-426E-40DD-AFC4-6F175D3DCCD1}">
+              <a14:hiddenFill xmlns:a14="http://schemas.microsoft.com/office/drawing/2010/main">
+                <a:solidFill>
+                  <a:schemeClr val="accent1"/>
+                </a:solidFill>
+              </a14:hiddenFill>
+            </a:ext>
+            <a:ext uri="{AF507438-7753-43E0-B8FC-AC1667EBCBE1}">
+              <a14:hiddenEffects xmlns:a14="http://schemas.microsoft.com/office/drawing/2010/main">
+                <a:effectLst>
+                  <a:outerShdw dist="35921" dir="2700000" algn="ctr" rotWithShape="0">
+                    <a:schemeClr val="bg2"/>
+                  </a:outerShdw>
+                </a:effectLst>
+              </a14:hiddenEffects>
+            </a:ext>
+          </a:extLst>
+        </p:spPr>
+        <p:txBody>
+          <a:bodyPr vert="horz" wrap="square" lIns="90000" tIns="46800" rIns="90000" bIns="46800" numCol="1" rtlCol="0" anchor="t" anchorCtr="0" compatLnSpc="1">
+            <a:prstTxWarp prst="textNoShape">
+              <a:avLst/>
+            </a:prstTxWarp>
+          </a:bodyPr>
+          <a:lstStyle/>
+          <a:p>
+            <a:pPr marL="0" marR="0" indent="0" algn="l" defTabSz="914400" rtl="0" eaLnBrk="0" fontAlgn="base" latinLnBrk="0" hangingPunct="0">
+              <a:lnSpc>
+                <a:spcPct val="100000"/>
+              </a:lnSpc>
+              <a:spcBef>
+                <a:spcPct val="0"/>
+              </a:spcBef>
+              <a:spcAft>
+                <a:spcPct val="0"/>
+              </a:spcAft>
+              <a:buClrTx/>
+              <a:buSzTx/>
+              <a:buFontTx/>
+              <a:buNone/>
+              <a:tabLst/>
+            </a:pPr>
+            <a:endParaRPr kumimoji="0" lang="de-DE" sz="2400" b="0" i="0" u="none" strike="noStrike" cap="none" normalizeH="0" baseline="0" smtClean="0">
+              <a:ln>
+                <a:noFill/>
+              </a:ln>
+              <a:solidFill>
+                <a:srgbClr val="000000"/>
+              </a:solidFill>
+              <a:effectLst/>
+              <a:latin typeface="Arial" charset="0"/>
+              <a:ea typeface="ＭＳ Ｐゴシック" pitchFamily="124" charset="-128"/>
+            </a:endParaRPr>
+          </a:p>
+        </p:txBody>
+      </p:sp>
       <p:pic>
         <p:nvPicPr>
-          <p:cNvPr id="7" name="Bild 6"/>
+          <p:cNvPr id="16" name="Bild 15"/>
           <p:cNvPicPr>
             <a:picLocks noChangeAspect="1"/>
           </p:cNvPicPr>
@@ -3600,8 +3816,8 @@
         </p:blipFill>
         <p:spPr>
           <a:xfrm>
-            <a:off x="809189" y="21233371"/>
-            <a:ext cx="19044861" cy="11084109"/>
+            <a:off x="2294819" y="19824171"/>
+            <a:ext cx="13255809" cy="9279066"/>
           </a:xfrm>
           <a:prstGeom prst="rect">
             <a:avLst/>
@@ -3610,14 +3826,200 @@
       </p:pic>
       <p:sp>
         <p:nvSpPr>
-          <p:cNvPr id="8" name="Textfeld 7"/>
+          <p:cNvPr id="17" name="Rechteck 16"/>
+          <p:cNvSpPr/>
+          <p:nvPr/>
+        </p:nvSpPr>
+        <p:spPr bwMode="auto">
+          <a:xfrm>
+            <a:off x="1220434" y="7207066"/>
+            <a:ext cx="26896987" cy="3135632"/>
+          </a:xfrm>
+          <a:prstGeom prst="rect">
+            <a:avLst/>
+          </a:prstGeom>
+          <a:solidFill>
+            <a:schemeClr val="bg1">
+              <a:lumMod val="75000"/>
+            </a:schemeClr>
+          </a:solidFill>
+          <a:ln>
+            <a:solidFill>
+              <a:schemeClr val="bg1">
+                <a:lumMod val="50000"/>
+              </a:schemeClr>
+            </a:solidFill>
+          </a:ln>
+          <a:effectLst/>
+          <a:extLst/>
+        </p:spPr>
+        <p:txBody>
+          <a:bodyPr vert="horz" wrap="square" lIns="90000" tIns="46800" rIns="90000" bIns="46800" numCol="1" rtlCol="0" anchor="t" anchorCtr="0" compatLnSpc="1">
+            <a:prstTxWarp prst="textNoShape">
+              <a:avLst/>
+            </a:prstTxWarp>
+          </a:bodyPr>
+          <a:lstStyle/>
+          <a:p>
+            <a:pPr marL="0" marR="0" indent="0" algn="l" defTabSz="914400" rtl="0" eaLnBrk="0" fontAlgn="base" latinLnBrk="0" hangingPunct="0">
+              <a:lnSpc>
+                <a:spcPct val="100000"/>
+              </a:lnSpc>
+              <a:spcBef>
+                <a:spcPct val="0"/>
+              </a:spcBef>
+              <a:spcAft>
+                <a:spcPct val="0"/>
+              </a:spcAft>
+              <a:buClrTx/>
+              <a:buSzTx/>
+              <a:buFontTx/>
+              <a:buNone/>
+              <a:tabLst/>
+            </a:pPr>
+            <a:r>
+              <a:rPr kumimoji="0" lang="de-DE" sz="5400" b="1" i="0" u="none" strike="noStrike" cap="none" normalizeH="0" baseline="0" dirty="0" smtClean="0">
+                <a:ln>
+                  <a:noFill/>
+                </a:ln>
+                <a:solidFill>
+                  <a:srgbClr val="CB1028"/>
+                </a:solidFill>
+                <a:effectLst/>
+                <a:latin typeface="Arial" charset="0"/>
+                <a:ea typeface="ＭＳ Ｐゴシック" pitchFamily="124" charset="-128"/>
+              </a:rPr>
+              <a:t>Einleitung</a:t>
+            </a:r>
+          </a:p>
+          <a:p>
+            <a:pPr marL="0" marR="0" indent="0" algn="just" defTabSz="914400" rtl="0" eaLnBrk="0" fontAlgn="base" latinLnBrk="0" hangingPunct="0">
+              <a:lnSpc>
+                <a:spcPct val="100000"/>
+              </a:lnSpc>
+              <a:spcBef>
+                <a:spcPct val="0"/>
+              </a:spcBef>
+              <a:spcAft>
+                <a:spcPct val="0"/>
+              </a:spcAft>
+              <a:buClrTx/>
+              <a:buSzTx/>
+              <a:buFontTx/>
+              <a:buNone/>
+              <a:tabLst/>
+            </a:pPr>
+            <a:r>
+              <a:rPr kumimoji="0" lang="de-DE" sz="4000" b="0" i="0" u="none" strike="noStrike" cap="none" normalizeH="0" baseline="0" dirty="0" smtClean="0">
+                <a:ln>
+                  <a:noFill/>
+                </a:ln>
+                <a:solidFill>
+                  <a:srgbClr val="000000"/>
+                </a:solidFill>
+                <a:effectLst/>
+                <a:ea typeface="ＭＳ Ｐゴシック" pitchFamily="124" charset="-128"/>
+              </a:rPr>
+              <a:t>Für Profilmessungen der Grenzschicht werden oft</a:t>
+            </a:r>
+            <a:r>
+              <a:rPr kumimoji="0" lang="de-DE" sz="4000" b="0" i="0" u="none" strike="noStrike" cap="none" normalizeH="0" dirty="0" smtClean="0">
+                <a:ln>
+                  <a:noFill/>
+                </a:ln>
+                <a:solidFill>
+                  <a:srgbClr val="000000"/>
+                </a:solidFill>
+                <a:effectLst/>
+                <a:ea typeface="ＭＳ Ｐゴシック" pitchFamily="124" charset="-128"/>
+              </a:rPr>
+              <a:t> Ballonaufstiege durchgeführt.</a:t>
+            </a:r>
+            <a:r>
+              <a:rPr lang="de-DE" sz="4000" dirty="0" smtClean="0">
+                <a:ea typeface="ＭＳ Ｐゴシック" pitchFamily="124" charset="-128"/>
+              </a:rPr>
+              <a:t> Da die Grenzschicht zeitlich und räumlich stark variabel ist, ist ein Einzelaufstieg meist nicht repräsentativ für den mittleren Zustand der Grenzschicht. Unsere Untersuchungen zeigen, wie viel Variabilität tatsächlich in einem Aufstieg steckt.</a:t>
+            </a:r>
+            <a:endParaRPr lang="de-DE" sz="4000" dirty="0" smtClean="0">
+              <a:ea typeface="ＭＳ Ｐゴシック" pitchFamily="124" charset="-128"/>
+            </a:endParaRPr>
+          </a:p>
+        </p:txBody>
+      </p:sp>
+      <p:sp>
+        <p:nvSpPr>
+          <p:cNvPr id="33" name="Rechteck 32"/>
+          <p:cNvSpPr/>
+          <p:nvPr/>
+        </p:nvSpPr>
+        <p:spPr bwMode="auto">
+          <a:xfrm>
+            <a:off x="1034597" y="31592857"/>
+            <a:ext cx="26896987" cy="3135632"/>
+          </a:xfrm>
+          <a:prstGeom prst="rect">
+            <a:avLst/>
+          </a:prstGeom>
+          <a:noFill/>
+          <a:ln>
+            <a:solidFill>
+              <a:schemeClr val="bg1">
+                <a:lumMod val="50000"/>
+              </a:schemeClr>
+            </a:solidFill>
+          </a:ln>
+          <a:effectLst/>
+          <a:extLst/>
+        </p:spPr>
+        <p:txBody>
+          <a:bodyPr vert="horz" wrap="square" lIns="90000" tIns="46800" rIns="90000" bIns="46800" numCol="1" rtlCol="0" anchor="t" anchorCtr="0" compatLnSpc="1">
+            <a:prstTxWarp prst="textNoShape">
+              <a:avLst/>
+            </a:prstTxWarp>
+          </a:bodyPr>
+          <a:lstStyle/>
+          <a:p>
+            <a:pPr marL="0" marR="0" indent="0" algn="l" defTabSz="914400" rtl="0" eaLnBrk="0" fontAlgn="base" latinLnBrk="0" hangingPunct="0">
+              <a:lnSpc>
+                <a:spcPct val="100000"/>
+              </a:lnSpc>
+              <a:spcBef>
+                <a:spcPct val="0"/>
+              </a:spcBef>
+              <a:spcAft>
+                <a:spcPct val="0"/>
+              </a:spcAft>
+              <a:buClrTx/>
+              <a:buSzTx/>
+              <a:buFontTx/>
+              <a:buNone/>
+              <a:tabLst/>
+            </a:pPr>
+            <a:endParaRPr kumimoji="0" lang="de-DE" sz="2400" b="0" i="0" u="none" strike="noStrike" cap="none" normalizeH="0" baseline="0" smtClean="0">
+              <a:ln>
+                <a:noFill/>
+              </a:ln>
+              <a:solidFill>
+                <a:srgbClr val="000000"/>
+              </a:solidFill>
+              <a:effectLst/>
+              <a:latin typeface="Arial" charset="0"/>
+              <a:ea typeface="ＭＳ Ｐゴシック" pitchFamily="124" charset="-128"/>
+            </a:endParaRPr>
+          </a:p>
+        </p:txBody>
+      </p:sp>
+      <p:sp>
+        <p:nvSpPr>
+          <p:cNvPr id="18" name="Textfeld 17"/>
           <p:cNvSpPr txBox="1"/>
           <p:nvPr/>
         </p:nvSpPr>
         <p:spPr>
           <a:xfrm>
-            <a:off x="19202400" y="11174618"/>
-            <a:ext cx="1277914" cy="492443"/>
+            <a:off x="1931013" y="11194218"/>
+            <a:ext cx="15006156" cy="6463308"/>
           </a:xfrm>
           <a:prstGeom prst="rect">
             <a:avLst/>
@@ -3625,29 +4027,79 @@
           <a:noFill/>
         </p:spPr>
         <p:txBody>
-          <a:bodyPr wrap="none" rtlCol="0">
+          <a:bodyPr wrap="square" rtlCol="0">
             <a:spAutoFit/>
           </a:bodyPr>
           <a:lstStyle/>
           <a:p>
             <a:r>
-              <a:rPr lang="de-DE" dirty="0" err="1" smtClean="0"/>
+              <a:rPr lang="de-DE" sz="5400" b="1" dirty="0" smtClean="0">
+                <a:solidFill>
+                  <a:srgbClr val="CB1028"/>
+                </a:solidFill>
+              </a:rPr>
+              <a:t>Methode</a:t>
+            </a:r>
+          </a:p>
+          <a:p>
+            <a:pPr algn="just"/>
+            <a:r>
+              <a:rPr lang="de-DE" sz="4000" dirty="0" smtClean="0"/>
+              <a:t>Um die Temperatur und Feuchte in der Grenzschicht kontinuierlich zu messen, wurden elf ALPACAs an der Leine eines </a:t>
+            </a:r>
+            <a:r>
+              <a:rPr lang="de-DE" sz="4000" dirty="0" err="1" smtClean="0"/>
+              <a:t>Helikites</a:t>
+            </a:r>
+            <a:r>
+              <a:rPr lang="de-DE" sz="4000" dirty="0" smtClean="0"/>
+              <a:t> in verschiedenen Höhen befestigt. Während der Messung wurde eine Radiosonde möglichst nahe am </a:t>
+            </a:r>
+            <a:r>
+              <a:rPr lang="de-DE" sz="4000" dirty="0" err="1" smtClean="0"/>
               <a:t>Helikite</a:t>
             </a:r>
-            <a:endParaRPr lang="de-DE" dirty="0"/>
+            <a:r>
+              <a:rPr lang="de-DE" sz="4000" dirty="0" smtClean="0"/>
+              <a:t> steigen gelassen. Aus den 3-sekündlichen ALPACA Messungen in der Zeit des </a:t>
+            </a:r>
+            <a:r>
+              <a:rPr lang="de-DE" sz="4000" dirty="0" err="1" smtClean="0"/>
+              <a:t>Radiosondenaufstiegs</a:t>
+            </a:r>
+            <a:r>
+              <a:rPr lang="de-DE" sz="4000" dirty="0" smtClean="0"/>
+              <a:t> (ca. 2-3 Minuten) wurde ein Ensemble von 30 </a:t>
+            </a:r>
+            <a:r>
+              <a:rPr lang="de-DE" sz="4000" dirty="0" err="1" smtClean="0"/>
+              <a:t>Radiosondenaufstiegen</a:t>
+            </a:r>
+            <a:r>
+              <a:rPr lang="de-DE" sz="4000" dirty="0" smtClean="0"/>
+              <a:t> simuliert. Anhand dieses Ensembles lässt sich bestimmen, wie stark Temperatur und Feuchte während des </a:t>
+            </a:r>
+            <a:r>
+              <a:rPr lang="de-DE" sz="4000" dirty="0" err="1" smtClean="0"/>
+              <a:t>Sondenaufstieges</a:t>
+            </a:r>
+            <a:r>
+              <a:rPr lang="de-DE" sz="4000" dirty="0" smtClean="0"/>
+              <a:t> variieren.</a:t>
+            </a:r>
           </a:p>
         </p:txBody>
       </p:sp>
       <p:sp>
         <p:nvSpPr>
-          <p:cNvPr id="30" name="Textfeld 29"/>
+          <p:cNvPr id="39" name="Textfeld 38"/>
           <p:cNvSpPr txBox="1"/>
           <p:nvPr/>
         </p:nvSpPr>
         <p:spPr>
           <a:xfrm>
-            <a:off x="23816450" y="11667061"/>
-            <a:ext cx="1967205" cy="492443"/>
+            <a:off x="15510871" y="19811784"/>
+            <a:ext cx="11425864" cy="4001095"/>
           </a:xfrm>
           <a:prstGeom prst="rect">
             <a:avLst/>
@@ -3655,16 +4107,31 @@
           <a:noFill/>
         </p:spPr>
         <p:txBody>
-          <a:bodyPr wrap="none" rtlCol="0">
+          <a:bodyPr wrap="square" rtlCol="0">
             <a:spAutoFit/>
           </a:bodyPr>
           <a:lstStyle/>
           <a:p>
             <a:r>
-              <a:rPr lang="de-DE" dirty="0" smtClean="0"/>
-              <a:t>Radiosonde</a:t>
-            </a:r>
-            <a:endParaRPr lang="de-DE" dirty="0"/>
+              <a:rPr lang="de-DE" sz="5400" b="1" dirty="0" smtClean="0">
+                <a:solidFill>
+                  <a:srgbClr val="CB1028"/>
+                </a:solidFill>
+              </a:rPr>
+              <a:t>Ergebnisse</a:t>
+            </a:r>
+          </a:p>
+          <a:p>
+            <a:pPr algn="just"/>
+            <a:r>
+              <a:rPr lang="de-DE" sz="4000" dirty="0" smtClean="0"/>
+              <a:t>Das gemessene Temperatur- und Feuchteprofil der Radiosonde deckt sich größtenteils mit den simulierten Ensembles (Abb. 1). Die Temperatur variiert im Messzeitraum um bis zu 1 K, </a:t>
+            </a:r>
+            <a:r>
+              <a:rPr lang="de-DE" sz="4000" smtClean="0"/>
+              <a:t>meist jedoch unter 0,5 K. </a:t>
+            </a:r>
+            <a:endParaRPr lang="de-DE" sz="4000" dirty="0" smtClean="0"/>
           </a:p>
         </p:txBody>
       </p:sp>
@@ -3673,6 +4140,13 @@
   <p:clrMapOvr>
     <a:masterClrMapping/>
   </p:clrMapOvr>
+  <p:timing>
+    <p:tnLst>
+      <p:par>
+        <p:cTn id="1" dur="indefinite" restart="never" nodeType="tmRoot"/>
+      </p:par>
+    </p:tnLst>
+  </p:timing>
 </p:sld>
 </file>
 

</xml_diff>

<commit_message>
Minor stuff, mostly Ensemble Poster
</commit_message>
<xml_diff>
--- a/poster/lex2018_poster_Profilensembles.pptx
+++ b/poster/lex2018_poster_Profilensembles.pptx
@@ -1157,7 +1157,7 @@
           <a:lstStyle/>
           <a:p>
             <a:pPr eaLnBrk="1" hangingPunct="1"/>
-            <a:endParaRPr lang="de-DE">
+            <a:endParaRPr lang="de-DE" dirty="0">
               <a:ea typeface="ＭＳ Ｐゴシック" charset="0"/>
             </a:endParaRPr>
           </a:p>
@@ -1911,8 +1911,8 @@
         </p:blipFill>
         <p:spPr>
           <a:xfrm>
-            <a:off x="23113333" y="11275753"/>
-            <a:ext cx="3863159" cy="5664449"/>
+            <a:off x="22020115" y="11940473"/>
+            <a:ext cx="4834624" cy="7088884"/>
           </a:xfrm>
           <a:prstGeom prst="rect">
             <a:avLst/>
@@ -1940,8 +1940,8 @@
         </p:blipFill>
         <p:spPr>
           <a:xfrm>
-            <a:off x="18614014" y="11275753"/>
-            <a:ext cx="4549803" cy="5664449"/>
+            <a:off x="18446821" y="11940473"/>
+            <a:ext cx="5693939" cy="7088884"/>
           </a:xfrm>
           <a:prstGeom prst="rect">
             <a:avLst/>
@@ -1958,8 +1958,8 @@
         </p:nvSpPr>
         <p:spPr bwMode="auto">
           <a:xfrm>
-            <a:off x="1835346" y="29164863"/>
-            <a:ext cx="15101823" cy="1323377"/>
+            <a:off x="1744119" y="29460136"/>
+            <a:ext cx="13766752" cy="1508043"/>
           </a:xfrm>
           <a:prstGeom prst="rect">
             <a:avLst/>
@@ -2102,261 +2102,18 @@
           </a:lstStyle>
           <a:p>
             <a:r>
-              <a:rPr lang="de-DE" sz="2000" b="1" i="1" u="sng" dirty="0"/>
+              <a:rPr lang="de-DE" sz="2400" b="1" i="1" u="sng" dirty="0"/>
               <a:t>Abbildung 1</a:t>
             </a:r>
             <a:r>
-              <a:rPr lang="de-DE" sz="2000" i="1" dirty="0"/>
-              <a:t>: Dies ist ein Beispiel für eine Bildunterschrift 20 </a:t>
-            </a:r>
-            <a:r>
-              <a:rPr lang="de-DE" sz="2000" i="1" dirty="0" err="1"/>
-              <a:t>pt</a:t>
-            </a:r>
-            <a:r>
-              <a:rPr lang="de-DE" sz="2000" i="1" dirty="0"/>
-              <a:t>. </a:t>
-            </a:r>
-            <a:r>
-              <a:rPr lang="de-DE" sz="2000" i="1" dirty="0" err="1"/>
-              <a:t>Eenis</a:t>
-            </a:r>
-            <a:r>
-              <a:rPr lang="de-DE" sz="2000" i="1" dirty="0"/>
-              <a:t> del </a:t>
-            </a:r>
-            <a:r>
-              <a:rPr lang="de-DE" sz="2000" i="1" dirty="0" err="1"/>
-              <a:t>init</a:t>
-            </a:r>
-            <a:r>
-              <a:rPr lang="de-DE" sz="2000" i="1" dirty="0"/>
-              <a:t> </a:t>
-            </a:r>
-            <a:r>
-              <a:rPr lang="de-DE" sz="2000" i="1" dirty="0" err="1"/>
-              <a:t>wis</a:t>
-            </a:r>
-            <a:r>
-              <a:rPr lang="de-DE" sz="2000" i="1" dirty="0"/>
-              <a:t> </a:t>
-            </a:r>
-            <a:r>
-              <a:rPr lang="de-DE" sz="2000" i="1" dirty="0" err="1"/>
-              <a:t>euisl</a:t>
-            </a:r>
-            <a:r>
-              <a:rPr lang="de-DE" sz="2000" i="1" dirty="0"/>
-              <a:t> </a:t>
-            </a:r>
-            <a:r>
-              <a:rPr lang="de-DE" sz="2000" i="1" dirty="0" err="1"/>
-              <a:t>essectet</a:t>
-            </a:r>
-            <a:r>
-              <a:rPr lang="de-DE" sz="2000" i="1" dirty="0"/>
-              <a:t>, </a:t>
-            </a:r>
-            <a:r>
-              <a:rPr lang="de-DE" sz="2000" i="1" dirty="0" err="1"/>
-              <a:t>quisuissit</a:t>
-            </a:r>
-            <a:r>
-              <a:rPr lang="de-DE" sz="2000" i="1" dirty="0"/>
-              <a:t> </a:t>
-            </a:r>
-            <a:r>
-              <a:rPr lang="de-DE" sz="2000" i="1" dirty="0" err="1"/>
-              <a:t>wis</a:t>
-            </a:r>
-            <a:r>
-              <a:rPr lang="de-DE" sz="2000" i="1" dirty="0"/>
-              <a:t> </a:t>
-            </a:r>
-            <a:r>
-              <a:rPr lang="de-DE" sz="2000" i="1" dirty="0" err="1"/>
-              <a:t>amet</a:t>
-            </a:r>
-            <a:r>
-              <a:rPr lang="de-DE" sz="2000" i="1" dirty="0"/>
-              <a:t> </a:t>
-            </a:r>
-            <a:r>
-              <a:rPr lang="de-DE" sz="2000" i="1" dirty="0" err="1"/>
-              <a:t>nisl</a:t>
-            </a:r>
-            <a:r>
-              <a:rPr lang="de-DE" sz="2000" i="1" dirty="0"/>
-              <a:t> </a:t>
-            </a:r>
-            <a:r>
-              <a:rPr lang="de-DE" sz="2000" i="1" dirty="0" err="1"/>
-              <a:t>iuscidunt</a:t>
-            </a:r>
-            <a:r>
-              <a:rPr lang="de-DE" sz="2000" i="1" dirty="0"/>
-              <a:t> </a:t>
-            </a:r>
-            <a:r>
-              <a:rPr lang="de-DE" sz="2000" i="1" dirty="0" err="1"/>
-              <a:t>senis</a:t>
-            </a:r>
-            <a:r>
-              <a:rPr lang="de-DE" sz="2000" i="1" dirty="0"/>
-              <a:t> del </a:t>
-            </a:r>
-            <a:r>
-              <a:rPr lang="de-DE" sz="2000" i="1" dirty="0" err="1"/>
-              <a:t>init</a:t>
-            </a:r>
-            <a:r>
-              <a:rPr lang="de-DE" sz="2000" i="1" dirty="0"/>
-              <a:t> </a:t>
-            </a:r>
-            <a:r>
-              <a:rPr lang="de-DE" sz="2000" i="1" dirty="0" err="1"/>
-              <a:t>wis</a:t>
-            </a:r>
-            <a:r>
-              <a:rPr lang="de-DE" sz="2000" i="1" dirty="0"/>
-              <a:t> </a:t>
-            </a:r>
-            <a:r>
-              <a:rPr lang="de-DE" sz="2000" i="1" dirty="0" err="1"/>
-              <a:t>euisl</a:t>
-            </a:r>
-            <a:r>
-              <a:rPr lang="de-DE" sz="2000" i="1" dirty="0"/>
-              <a:t> </a:t>
-            </a:r>
-            <a:r>
-              <a:rPr lang="de-DE" sz="2000" i="1" dirty="0" err="1"/>
-              <a:t>essectet</a:t>
-            </a:r>
-            <a:r>
-              <a:rPr lang="de-DE" sz="2000" i="1" dirty="0"/>
-              <a:t>, cum es </a:t>
-            </a:r>
-            <a:r>
-              <a:rPr lang="de-DE" sz="2000" i="1" dirty="0" err="1"/>
-              <a:t>quisuissit</a:t>
-            </a:r>
-            <a:r>
-              <a:rPr lang="de-DE" sz="2000" i="1" dirty="0"/>
-              <a:t> </a:t>
-            </a:r>
-            <a:r>
-              <a:rPr lang="de-DE" sz="2000" i="1" dirty="0" err="1"/>
-              <a:t>wis</a:t>
-            </a:r>
-            <a:r>
-              <a:rPr lang="de-DE" sz="2000" i="1" dirty="0"/>
-              <a:t> </a:t>
-            </a:r>
-            <a:r>
-              <a:rPr lang="de-DE" sz="2000" i="1" dirty="0" err="1"/>
-              <a:t>amet</a:t>
-            </a:r>
-            <a:r>
-              <a:rPr lang="de-DE" sz="2000" i="1" dirty="0"/>
-              <a:t> </a:t>
-            </a:r>
-            <a:r>
-              <a:rPr lang="de-DE" sz="2000" i="1" dirty="0" err="1"/>
-              <a:t>nisl</a:t>
-            </a:r>
-            <a:r>
-              <a:rPr lang="de-DE" sz="2000" i="1" dirty="0"/>
-              <a:t> </a:t>
-            </a:r>
-            <a:r>
-              <a:rPr lang="de-DE" sz="2000" i="1" dirty="0" err="1"/>
-              <a:t>iuscidunt</a:t>
-            </a:r>
-            <a:r>
-              <a:rPr lang="de-DE" sz="2000" i="1" dirty="0"/>
-              <a:t>. </a:t>
-            </a:r>
-            <a:r>
-              <a:rPr lang="de-DE" sz="2000" i="1" dirty="0" err="1"/>
-              <a:t>Auenis</a:t>
-            </a:r>
-            <a:r>
-              <a:rPr lang="de-DE" sz="2000" i="1" dirty="0"/>
-              <a:t> del </a:t>
-            </a:r>
-            <a:r>
-              <a:rPr lang="de-DE" sz="2000" i="1" dirty="0" err="1"/>
-              <a:t>init</a:t>
-            </a:r>
-            <a:r>
-              <a:rPr lang="de-DE" sz="2000" i="1" dirty="0"/>
-              <a:t> </a:t>
-            </a:r>
-            <a:r>
-              <a:rPr lang="de-DE" sz="2000" i="1" dirty="0" err="1"/>
-              <a:t>wis</a:t>
-            </a:r>
-            <a:r>
-              <a:rPr lang="de-DE" sz="2000" i="1" dirty="0"/>
-              <a:t> </a:t>
-            </a:r>
-            <a:r>
-              <a:rPr lang="de-DE" sz="2000" i="1" dirty="0" err="1"/>
-              <a:t>euisl</a:t>
-            </a:r>
-            <a:r>
-              <a:rPr lang="de-DE" sz="2000" i="1" dirty="0"/>
-              <a:t> </a:t>
-            </a:r>
-            <a:r>
-              <a:rPr lang="de-DE" sz="2000" i="1" dirty="0" err="1"/>
-              <a:t>essectet</a:t>
-            </a:r>
-            <a:r>
-              <a:rPr lang="de-DE" sz="2000" i="1" dirty="0"/>
-              <a:t>, </a:t>
-            </a:r>
-            <a:r>
-              <a:rPr lang="de-DE" sz="2000" i="1" dirty="0" err="1"/>
-              <a:t>quisuissit</a:t>
-            </a:r>
-            <a:r>
-              <a:rPr lang="de-DE" sz="2000" i="1" dirty="0"/>
-              <a:t> </a:t>
-            </a:r>
-            <a:r>
-              <a:rPr lang="de-DE" sz="2000" i="1" dirty="0" err="1"/>
-              <a:t>wis</a:t>
-            </a:r>
-            <a:r>
-              <a:rPr lang="de-DE" sz="2000" i="1" dirty="0"/>
-              <a:t> </a:t>
-            </a:r>
-            <a:r>
-              <a:rPr lang="de-DE" sz="2000" i="1" dirty="0" err="1"/>
-              <a:t>amet</a:t>
-            </a:r>
-            <a:r>
-              <a:rPr lang="de-DE" sz="2000" i="1" dirty="0"/>
-              <a:t> </a:t>
-            </a:r>
-            <a:r>
-              <a:rPr lang="de-DE" sz="2000" i="1" dirty="0" err="1"/>
-              <a:t>nisl</a:t>
-            </a:r>
-            <a:r>
-              <a:rPr lang="de-DE" sz="2000" i="1" dirty="0"/>
-              <a:t> </a:t>
-            </a:r>
-            <a:r>
-              <a:rPr lang="de-DE" sz="2000" i="1" dirty="0" err="1"/>
-              <a:t>iuscidunt</a:t>
-            </a:r>
-            <a:r>
-              <a:rPr lang="de-DE" sz="2000" i="1" dirty="0"/>
-              <a:t>.</a:t>
-            </a:r>
+              <a:rPr lang="de-DE" sz="2400" i="1" dirty="0"/>
+              <a:t>: </a:t>
+            </a:r>
+            <a:r>
+              <a:rPr lang="de-DE" sz="2400" i="1" dirty="0" smtClean="0"/>
+              <a:t>Temperatur. (links) und Feuchteprofil einer Radiosonde (rot) und 30 simulierten Einzelprofilen der ALPACAS (hellblau) sowie deren zeitliches Mittel (schwarz). Alle Profile stammen vom 29.8.2018 aus der Zeit zwischen 12:59 und 13:02 Uhr.</a:t>
+            </a:r>
+            <a:endParaRPr lang="de-DE" sz="2400" i="1" dirty="0"/>
           </a:p>
           <a:p>
             <a:endParaRPr lang="de-DE" sz="2000" dirty="0"/>
@@ -3578,8 +3335,8 @@
         </p:nvSpPr>
         <p:spPr>
           <a:xfrm>
-            <a:off x="19611002" y="14050266"/>
-            <a:ext cx="1277914" cy="492443"/>
+            <a:off x="19443809" y="15202336"/>
+            <a:ext cx="1599270" cy="492443"/>
           </a:xfrm>
           <a:prstGeom prst="rect">
             <a:avLst/>
@@ -3587,7 +3344,7 @@
           <a:noFill/>
         </p:spPr>
         <p:txBody>
-          <a:bodyPr wrap="none" rtlCol="0">
+          <a:bodyPr wrap="square" rtlCol="0">
             <a:spAutoFit/>
           </a:bodyPr>
           <a:lstStyle/>
@@ -3608,8 +3365,8 @@
         </p:nvSpPr>
         <p:spPr>
           <a:xfrm>
-            <a:off x="24225052" y="14542709"/>
-            <a:ext cx="1967205" cy="492443"/>
+            <a:off x="24018102" y="15731355"/>
+            <a:ext cx="2461897" cy="492443"/>
           </a:xfrm>
           <a:prstGeom prst="rect">
             <a:avLst/>
@@ -3617,7 +3374,7 @@
           <a:noFill/>
         </p:spPr>
         <p:txBody>
-          <a:bodyPr wrap="none" rtlCol="0">
+          <a:bodyPr wrap="square" rtlCol="0">
             <a:spAutoFit/>
           </a:bodyPr>
           <a:lstStyle/>
@@ -3638,7 +3395,7 @@
         </p:nvSpPr>
         <p:spPr bwMode="auto">
           <a:xfrm>
-            <a:off x="1220434" y="10738742"/>
+            <a:off x="1220434" y="11362352"/>
             <a:ext cx="26711150" cy="8138906"/>
           </a:xfrm>
           <a:prstGeom prst="rect">
@@ -3720,8 +3477,8 @@
         </p:nvSpPr>
         <p:spPr bwMode="auto">
           <a:xfrm>
-            <a:off x="1220434" y="19273692"/>
-            <a:ext cx="26806603" cy="11133029"/>
+            <a:off x="1220434" y="19804340"/>
+            <a:ext cx="26806603" cy="11649399"/>
           </a:xfrm>
           <a:prstGeom prst="rect">
             <a:avLst/>
@@ -3794,36 +3551,6 @@
           </a:p>
         </p:txBody>
       </p:sp>
-      <p:pic>
-        <p:nvPicPr>
-          <p:cNvPr id="16" name="Bild 15"/>
-          <p:cNvPicPr>
-            <a:picLocks noChangeAspect="1"/>
-          </p:cNvPicPr>
-          <p:nvPr/>
-        </p:nvPicPr>
-        <p:blipFill>
-          <a:blip r:embed="rId8">
-            <a:extLst>
-              <a:ext uri="{28A0092B-C50C-407E-A947-70E740481C1C}">
-                <a14:useLocalDpi xmlns:a14="http://schemas.microsoft.com/office/drawing/2010/main" val="0"/>
-              </a:ext>
-            </a:extLst>
-          </a:blip>
-          <a:stretch>
-            <a:fillRect/>
-          </a:stretch>
-        </p:blipFill>
-        <p:spPr>
-          <a:xfrm>
-            <a:off x="1468792" y="19528724"/>
-            <a:ext cx="13200135" cy="9240095"/>
-          </a:xfrm>
-          <a:prstGeom prst="rect">
-            <a:avLst/>
-          </a:prstGeom>
-        </p:spPr>
-      </p:pic>
       <p:sp>
         <p:nvSpPr>
           <p:cNvPr id="17" name="Rechteck 16"/>
@@ -3832,7 +3559,7 @@
         </p:nvSpPr>
         <p:spPr bwMode="auto">
           <a:xfrm>
-            <a:off x="1220434" y="7207066"/>
+            <a:off x="-34747616" y="4696025"/>
             <a:ext cx="26896987" cy="3135632"/>
           </a:xfrm>
           <a:prstGeom prst="rect">
@@ -3945,14 +3672,23 @@
               <a:rPr lang="de-DE" sz="4000" dirty="0" smtClean="0">
                 <a:ea typeface="ＭＳ Ｐゴシック" pitchFamily="124" charset="-128"/>
               </a:rPr>
-              <a:t>Ziel der Untersuchung ist zu </a:t>
+              <a:t>Aber wie gut repräsentiert ein Einzelaufstieg den </a:t>
+            </a:r>
+            <a:r>
+              <a:rPr lang="de-DE" sz="4000" dirty="0" err="1" smtClean="0">
+                <a:ea typeface="ＭＳ Ｐゴシック" pitchFamily="124" charset="-128"/>
+              </a:rPr>
+              <a:t>instantanen</a:t>
             </a:r>
             <a:r>
               <a:rPr lang="de-DE" sz="4000" dirty="0" smtClean="0">
                 <a:ea typeface="ＭＳ Ｐゴシック" pitchFamily="124" charset="-128"/>
               </a:rPr>
-              <a:t>zeigen, wie viel Variabilität tatsächlich in einem Aufstieg steckt.</a:t>
-            </a:r>
+              <a:t> Zustand der Grenzschicht? Wie groß sind die </a:t>
+            </a:r>
+            <a:endParaRPr lang="de-DE" sz="4000" dirty="0" smtClean="0">
+              <a:ea typeface="ＭＳ Ｐゴシック" pitchFamily="124" charset="-128"/>
+            </a:endParaRPr>
           </a:p>
         </p:txBody>
       </p:sp>
@@ -3964,8 +3700,8 @@
         </p:nvSpPr>
         <p:spPr>
           <a:xfrm>
-            <a:off x="1931013" y="11194218"/>
-            <a:ext cx="15006156" cy="6463308"/>
+            <a:off x="1931013" y="11561796"/>
+            <a:ext cx="15006156" cy="7571303"/>
           </a:xfrm>
           <a:prstGeom prst="rect">
             <a:avLst/>
@@ -3990,47 +3726,59 @@
           <a:p>
             <a:pPr algn="just"/>
             <a:r>
-              <a:rPr lang="de-DE" sz="4000" dirty="0" smtClean="0"/>
-              <a:t>Um die Temperatur und Feuchte in der Grenzschicht kontinuierlich zu messen, wurden elf ALPACAs an der Leine eines </a:t>
-            </a:r>
-            <a:r>
-              <a:rPr lang="de-DE" sz="4000" dirty="0" err="1" smtClean="0"/>
+              <a:rPr lang="de-DE" sz="3600" dirty="0" smtClean="0"/>
+              <a:t>Zur Einschätzung der Variabilität </a:t>
+            </a:r>
+            <a:r>
+              <a:rPr lang="de-DE" sz="3600" dirty="0" smtClean="0"/>
+              <a:t>der Grenzschicht während eines Aufstieges wurde eine Messung einer Radiosonde mit gleichzeitigen kontinuierlichen Messungen der Grenzschicht verglichen. Die Messungen wurden am 29.8.2018 in Marienleuchte durchgeführt. </a:t>
+            </a:r>
+            <a:r>
+              <a:rPr lang="de-DE" sz="3600" dirty="0" smtClean="0"/>
+              <a:t>Um </a:t>
+            </a:r>
+            <a:r>
+              <a:rPr lang="de-DE" sz="3600" dirty="0" smtClean="0"/>
+              <a:t>die Temperatur und Feuchte in der Grenzschicht kontinuierlich zu messen, wurden elf ALPACAs an der Leine eines </a:t>
+            </a:r>
+            <a:r>
+              <a:rPr lang="de-DE" sz="3600" dirty="0" err="1" smtClean="0"/>
               <a:t>Helikites</a:t>
             </a:r>
             <a:r>
-              <a:rPr lang="de-DE" sz="4000" dirty="0" smtClean="0"/>
+              <a:rPr lang="de-DE" sz="3600" dirty="0" smtClean="0"/>
               <a:t> in verschiedenen Höhen befestigt. Während der Messung wurde eine Radiosonde möglichst nahe am </a:t>
             </a:r>
             <a:r>
-              <a:rPr lang="de-DE" sz="4000" dirty="0" err="1" smtClean="0"/>
+              <a:rPr lang="de-DE" sz="3600" dirty="0" err="1" smtClean="0"/>
               <a:t>Helikite</a:t>
             </a:r>
             <a:r>
-              <a:rPr lang="de-DE" sz="4000" dirty="0" smtClean="0"/>
+              <a:rPr lang="de-DE" sz="3600" dirty="0" smtClean="0"/>
               <a:t> steigen gelassen. Aus den 3-sekündlichen ALPACA Messungen in der Zeit des </a:t>
             </a:r>
             <a:r>
-              <a:rPr lang="de-DE" sz="4000" dirty="0" err="1" smtClean="0"/>
+              <a:rPr lang="de-DE" sz="3600" dirty="0" err="1" smtClean="0"/>
               <a:t>Radiosondenaufstiegs</a:t>
             </a:r>
             <a:r>
-              <a:rPr lang="de-DE" sz="4000" dirty="0" smtClean="0"/>
+              <a:rPr lang="de-DE" sz="3600" dirty="0" smtClean="0"/>
               <a:t> (ca. 2-3 Minuten) wurde ein Ensemble von 30 </a:t>
             </a:r>
             <a:r>
-              <a:rPr lang="de-DE" sz="4000" dirty="0" err="1" smtClean="0"/>
+              <a:rPr lang="de-DE" sz="3600" dirty="0" err="1" smtClean="0"/>
               <a:t>Radiosondenaufstiegen</a:t>
             </a:r>
             <a:r>
-              <a:rPr lang="de-DE" sz="4000" dirty="0" smtClean="0"/>
+              <a:rPr lang="de-DE" sz="3600" dirty="0" smtClean="0"/>
               <a:t> simuliert. Anhand dieses Ensembles lässt sich bestimmen, wie stark Temperatur und Feuchte während des </a:t>
             </a:r>
             <a:r>
-              <a:rPr lang="de-DE" sz="4000" dirty="0" err="1" smtClean="0"/>
+              <a:rPr lang="de-DE" sz="3600" dirty="0" err="1" smtClean="0"/>
               <a:t>Sondenaufstieges</a:t>
             </a:r>
             <a:r>
-              <a:rPr lang="de-DE" sz="4000" dirty="0" smtClean="0"/>
+              <a:rPr lang="de-DE" sz="3600" dirty="0" smtClean="0"/>
               <a:t> variieren.</a:t>
             </a:r>
           </a:p>
@@ -4044,8 +3792,8 @@
         </p:nvSpPr>
         <p:spPr>
           <a:xfrm>
-            <a:off x="15510871" y="19811784"/>
-            <a:ext cx="11425864" cy="5232202"/>
+            <a:off x="15510870" y="20342432"/>
+            <a:ext cx="12012111" cy="7632859"/>
           </a:xfrm>
           <a:prstGeom prst="rect">
             <a:avLst/>
@@ -4075,13 +3823,48 @@
           <a:p>
             <a:pPr algn="just"/>
             <a:r>
-              <a:rPr lang="de-DE" sz="4000" dirty="0" smtClean="0"/>
-              <a:t>Das gemessene Temperatur- und Feuchteprofil der Radiosonde deckt sich größtenteils mit den simulierten Ensembles (Abb. 1). Die Temperatur variiert im Messzeitraum um bis zu 1 K, meist jedoch unter 0,5 K</a:t>
-            </a:r>
-            <a:r>
-              <a:rPr lang="de-DE" sz="4000" dirty="0" smtClean="0"/>
-              <a:t>. Die relative Feuchte variiert stärker, um bis zu 10 %.</a:t>
-            </a:r>
+              <a:rPr lang="de-DE" sz="3600" dirty="0" smtClean="0"/>
+              <a:t>Das gemessene Temperatur- und Feuchteprofil der Radiosonde deckt sich größtenteils mit den simulierten Ensembles (Abb. 1</a:t>
+            </a:r>
+            <a:r>
+              <a:rPr lang="de-DE" sz="3600" dirty="0" smtClean="0"/>
+              <a:t>). In etwa 400 m Höhe befindet sich die Oberkante einer Grenzschicht, die besonders am starken Gradienten der relativen Feuchte zu erkennen ist. </a:t>
+            </a:r>
+          </a:p>
+          <a:p>
+            <a:pPr algn="just"/>
+            <a:r>
+              <a:rPr lang="de-DE" sz="3600" dirty="0" smtClean="0"/>
+              <a:t>Die </a:t>
+            </a:r>
+            <a:r>
+              <a:rPr lang="de-DE" sz="3600" dirty="0" smtClean="0"/>
+              <a:t>Temperatur variiert im Messzeitraum um bis zu 1 K, meist jedoch unter 0,5 K</a:t>
+            </a:r>
+            <a:r>
+              <a:rPr lang="de-DE" sz="3600" dirty="0" smtClean="0"/>
+              <a:t>. Die relative Feuchte variiert stärker, meist 3 </a:t>
+            </a:r>
+            <a:r>
+              <a:rPr lang="de-DE" sz="3600" dirty="0"/>
+              <a:t>-</a:t>
+            </a:r>
+            <a:r>
+              <a:rPr lang="de-DE" sz="3600" dirty="0" smtClean="0"/>
+              <a:t> </a:t>
+            </a:r>
+            <a:r>
+              <a:rPr lang="de-DE" sz="3600" dirty="0" smtClean="0"/>
+              <a:t>5 %. An der Oberkante der Grenzschicht variiert die Feuchte bis zu 10 %. </a:t>
+            </a:r>
+          </a:p>
+          <a:p>
+            <a:pPr algn="just"/>
+            <a:endParaRPr lang="de-DE" sz="3600" dirty="0" smtClean="0"/>
+          </a:p>
+          <a:p>
+            <a:pPr algn="just"/>
+            <a:endParaRPr lang="de-DE" sz="3600" dirty="0" smtClean="0"/>
           </a:p>
           <a:p>
             <a:pPr algn="just"/>
@@ -4101,7 +3884,7 @@
         </p:nvSpPr>
         <p:spPr bwMode="auto">
           <a:xfrm>
-            <a:off x="1220434" y="31377268"/>
+            <a:off x="1130049" y="31925640"/>
             <a:ext cx="26896987" cy="3135632"/>
           </a:xfrm>
           <a:prstGeom prst="rect">
@@ -4175,41 +3958,217 @@
           <a:p>
             <a:pPr algn="just"/>
             <a:r>
-              <a:rPr lang="de-DE" sz="4000" dirty="0" smtClean="0">
+              <a:rPr lang="de-DE" sz="3600" dirty="0" smtClean="0">
                 <a:ea typeface="ＭＳ Ｐゴシック" pitchFamily="124" charset="-128"/>
               </a:rPr>
               <a:t>Die Temperatur</a:t>
             </a:r>
             <a:r>
-              <a:rPr lang="de-DE" sz="4000" dirty="0">
+              <a:rPr lang="de-DE" sz="3600" dirty="0">
                 <a:ea typeface="ＭＳ Ｐゴシック" pitchFamily="124" charset="-128"/>
               </a:rPr>
               <a:t> variiert </a:t>
             </a:r>
             <a:r>
-              <a:rPr lang="de-DE" sz="4000" dirty="0" smtClean="0">
+              <a:rPr lang="de-DE" sz="3600" dirty="0" smtClean="0">
                 <a:ea typeface="ＭＳ Ｐゴシック" pitchFamily="124" charset="-128"/>
               </a:rPr>
               <a:t> binnen eines </a:t>
             </a:r>
             <a:r>
-              <a:rPr lang="de-DE" sz="4000" dirty="0" err="1" smtClean="0">
+              <a:rPr lang="de-DE" sz="3600" dirty="0" err="1" smtClean="0">
                 <a:ea typeface="ＭＳ Ｐゴシック" pitchFamily="124" charset="-128"/>
               </a:rPr>
               <a:t>Radiosondenaufstiegs</a:t>
             </a:r>
             <a:r>
-              <a:rPr lang="de-DE" sz="4000" dirty="0" smtClean="0">
+              <a:rPr lang="de-DE" sz="3600" dirty="0" smtClean="0">
                 <a:ea typeface="ＭＳ Ｐゴシック" pitchFamily="124" charset="-128"/>
               </a:rPr>
               <a:t> nur geringfügig, während die Feuchte um bis zu 5 % vom mittleren Zustand der Grenzschicht abweichen kann.</a:t>
             </a:r>
-            <a:endParaRPr lang="de-DE" sz="4000" dirty="0" smtClean="0">
+            <a:endParaRPr lang="de-DE" sz="3600" dirty="0" smtClean="0">
               <a:ea typeface="ＭＳ Ｐゴシック" pitchFamily="124" charset="-128"/>
             </a:endParaRPr>
           </a:p>
         </p:txBody>
       </p:sp>
+      <p:sp>
+        <p:nvSpPr>
+          <p:cNvPr id="35" name="Rechteck 34"/>
+          <p:cNvSpPr/>
+          <p:nvPr/>
+        </p:nvSpPr>
+        <p:spPr bwMode="auto">
+          <a:xfrm>
+            <a:off x="1220434" y="7047886"/>
+            <a:ext cx="26302547" cy="4011384"/>
+          </a:xfrm>
+          <a:prstGeom prst="rect">
+            <a:avLst/>
+          </a:prstGeom>
+          <a:solidFill>
+            <a:schemeClr val="bg1"/>
+          </a:solidFill>
+          <a:ln>
+            <a:noFill/>
+          </a:ln>
+          <a:effectLst/>
+          <a:extLst/>
+        </p:spPr>
+        <p:txBody>
+          <a:bodyPr vert="horz" wrap="square" lIns="90000" tIns="46800" rIns="90000" bIns="46800" numCol="1" rtlCol="0" anchor="t" anchorCtr="0" compatLnSpc="1">
+            <a:prstTxWarp prst="textNoShape">
+              <a:avLst/>
+            </a:prstTxWarp>
+          </a:bodyPr>
+          <a:lstStyle/>
+          <a:p>
+            <a:pPr marL="0" marR="0" indent="0" algn="l" defTabSz="914400" rtl="0" eaLnBrk="0" fontAlgn="base" latinLnBrk="0" hangingPunct="0">
+              <a:lnSpc>
+                <a:spcPct val="100000"/>
+              </a:lnSpc>
+              <a:spcBef>
+                <a:spcPct val="0"/>
+              </a:spcBef>
+              <a:spcAft>
+                <a:spcPct val="0"/>
+              </a:spcAft>
+              <a:buClrTx/>
+              <a:buSzTx/>
+              <a:buFontTx/>
+              <a:buNone/>
+              <a:tabLst/>
+            </a:pPr>
+            <a:r>
+              <a:rPr kumimoji="0" lang="de-DE" sz="5400" b="1" i="0" u="none" strike="noStrike" cap="none" normalizeH="0" baseline="0" dirty="0" smtClean="0">
+                <a:ln>
+                  <a:noFill/>
+                </a:ln>
+                <a:solidFill>
+                  <a:srgbClr val="CB1028"/>
+                </a:solidFill>
+                <a:effectLst/>
+                <a:latin typeface="Arial" charset="0"/>
+                <a:ea typeface="ＭＳ Ｐゴシック" pitchFamily="124" charset="-128"/>
+              </a:rPr>
+              <a:t>Motivation</a:t>
+            </a:r>
+            <a:endParaRPr kumimoji="0" lang="de-DE" sz="5400" b="1" i="0" u="none" strike="noStrike" cap="none" normalizeH="0" baseline="0" dirty="0" smtClean="0">
+              <a:ln>
+                <a:noFill/>
+              </a:ln>
+              <a:solidFill>
+                <a:srgbClr val="CB1028"/>
+              </a:solidFill>
+              <a:effectLst/>
+              <a:latin typeface="Arial" charset="0"/>
+              <a:ea typeface="ＭＳ Ｐゴシック" pitchFamily="124" charset="-128"/>
+            </a:endParaRPr>
+          </a:p>
+          <a:p>
+            <a:pPr marL="0" marR="0" indent="0" algn="just" defTabSz="914400" rtl="0" eaLnBrk="0" fontAlgn="base" latinLnBrk="0" hangingPunct="0">
+              <a:lnSpc>
+                <a:spcPct val="100000"/>
+              </a:lnSpc>
+              <a:spcBef>
+                <a:spcPct val="0"/>
+              </a:spcBef>
+              <a:spcAft>
+                <a:spcPct val="0"/>
+              </a:spcAft>
+              <a:buClrTx/>
+              <a:buSzTx/>
+              <a:buFontTx/>
+              <a:buNone/>
+              <a:tabLst/>
+            </a:pPr>
+            <a:r>
+              <a:rPr kumimoji="0" lang="de-DE" sz="3600" b="0" i="1" u="none" strike="noStrike" cap="none" normalizeH="0" baseline="0" dirty="0" smtClean="0">
+                <a:ln>
+                  <a:noFill/>
+                </a:ln>
+                <a:solidFill>
+                  <a:srgbClr val="000000"/>
+                </a:solidFill>
+                <a:effectLst/>
+                <a:ea typeface="ＭＳ Ｐゴシック" pitchFamily="124" charset="-128"/>
+              </a:rPr>
+              <a:t>Für Profilmessungen der Grenzschicht werden oft</a:t>
+            </a:r>
+            <a:r>
+              <a:rPr kumimoji="0" lang="de-DE" sz="3600" b="0" i="1" u="none" strike="noStrike" cap="none" normalizeH="0" dirty="0" smtClean="0">
+                <a:ln>
+                  <a:noFill/>
+                </a:ln>
+                <a:solidFill>
+                  <a:srgbClr val="000000"/>
+                </a:solidFill>
+                <a:effectLst/>
+                <a:ea typeface="ＭＳ Ｐゴシック" pitchFamily="124" charset="-128"/>
+              </a:rPr>
+              <a:t> Ballonaufstiege durchgeführt.</a:t>
+            </a:r>
+            <a:r>
+              <a:rPr lang="de-DE" sz="3600" i="1" dirty="0" smtClean="0">
+                <a:ea typeface="ＭＳ Ｐゴシック" pitchFamily="124" charset="-128"/>
+              </a:rPr>
+              <a:t> Da die Grenzschicht zeitlich und räumlich stark variabel ist, ist ein Einzelaufstieg meist nicht repräsentativ für den mittleren Zustand der Grenzschicht. </a:t>
+            </a:r>
+            <a:r>
+              <a:rPr lang="de-DE" sz="3600" i="1" dirty="0" smtClean="0">
+                <a:ea typeface="ＭＳ Ｐゴシック" pitchFamily="124" charset="-128"/>
+              </a:rPr>
+              <a:t>Aber wie gut repräsentiert ein einzelner Aufstieg den </a:t>
+            </a:r>
+            <a:r>
+              <a:rPr lang="de-DE" sz="3600" i="1" dirty="0" err="1" smtClean="0">
+                <a:ea typeface="ＭＳ Ｐゴシック" pitchFamily="124" charset="-128"/>
+              </a:rPr>
+              <a:t>instantanen</a:t>
+            </a:r>
+            <a:r>
+              <a:rPr lang="de-DE" sz="3600" i="1" dirty="0" smtClean="0">
+                <a:ea typeface="ＭＳ Ｐゴシック" pitchFamily="124" charset="-128"/>
+              </a:rPr>
+              <a:t> Zustand der Grenzschicht? Wieviel Fehler entsteht dadurch, dass der Sensor nicht an einem Zeitpunkt die ganze Grenzschicht misst? Mit den kontinuierlichen Messungen der ALPACAS lassen sich diese Fragen beantworten.</a:t>
+            </a:r>
+            <a:endParaRPr lang="de-DE" sz="3600" i="1" dirty="0" smtClean="0">
+              <a:ea typeface="ＭＳ Ｐゴシック" pitchFamily="124" charset="-128"/>
+            </a:endParaRPr>
+          </a:p>
+        </p:txBody>
+      </p:sp>
+      <p:pic>
+        <p:nvPicPr>
+          <p:cNvPr id="7" name="Bild 6"/>
+          <p:cNvPicPr>
+            <a:picLocks noChangeAspect="1"/>
+          </p:cNvPicPr>
+          <p:nvPr/>
+        </p:nvPicPr>
+        <p:blipFill>
+          <a:blip r:embed="rId8">
+            <a:extLst>
+              <a:ext uri="{28A0092B-C50C-407E-A947-70E740481C1C}">
+                <a14:useLocalDpi xmlns:a14="http://schemas.microsoft.com/office/drawing/2010/main" val="0"/>
+              </a:ext>
+            </a:extLst>
+          </a:blip>
+          <a:stretch>
+            <a:fillRect/>
+          </a:stretch>
+        </p:blipFill>
+        <p:spPr>
+          <a:xfrm>
+            <a:off x="1745262" y="20244600"/>
+            <a:ext cx="12994866" cy="9096406"/>
+          </a:xfrm>
+          <a:prstGeom prst="rect">
+            <a:avLst/>
+          </a:prstGeom>
+        </p:spPr>
+      </p:pic>
     </p:spTree>
   </p:cSld>
   <p:clrMapOvr>

</xml_diff>

<commit_message>
Further work on Profilensemble poster
</commit_message>
<xml_diff>
--- a/poster/lex2018_poster_Profilensembles.pptx
+++ b/poster/lex2018_poster_Profilensembles.pptx
@@ -295,7 +295,7 @@
               <a:pPr>
                 <a:defRPr/>
               </a:pPr>
-              <a:t>11.09.18</a:t>
+              <a:t>14.09.18</a:t>
             </a:fld>
             <a:endParaRPr lang="de-DE"/>
           </a:p>
@@ -1892,6 +1892,36 @@
       </p:grpSpPr>
       <p:pic>
         <p:nvPicPr>
+          <p:cNvPr id="15" name="Bild 14"/>
+          <p:cNvPicPr>
+            <a:picLocks noChangeAspect="1"/>
+          </p:cNvPicPr>
+          <p:nvPr/>
+        </p:nvPicPr>
+        <p:blipFill>
+          <a:blip r:embed="rId3">
+            <a:extLst>
+              <a:ext uri="{28A0092B-C50C-407E-A947-70E740481C1C}">
+                <a14:useLocalDpi xmlns:a14="http://schemas.microsoft.com/office/drawing/2010/main" val="0"/>
+              </a:ext>
+            </a:extLst>
+          </a:blip>
+          <a:stretch>
+            <a:fillRect/>
+          </a:stretch>
+        </p:blipFill>
+        <p:spPr>
+          <a:xfrm>
+            <a:off x="1130049" y="19999701"/>
+            <a:ext cx="13732609" cy="9612826"/>
+          </a:xfrm>
+          <a:prstGeom prst="rect">
+            <a:avLst/>
+          </a:prstGeom>
+        </p:spPr>
+      </p:pic>
+      <p:pic>
+        <p:nvPicPr>
           <p:cNvPr id="5" name="Bild 4"/>
           <p:cNvPicPr>
             <a:picLocks noChangeAspect="1"/>
@@ -1899,7 +1929,7 @@
           <p:nvPr/>
         </p:nvPicPr>
         <p:blipFill rotWithShape="1">
-          <a:blip r:embed="rId3">
+          <a:blip r:embed="rId4">
             <a:extLst>
               <a:ext uri="{28A0092B-C50C-407E-A947-70E740481C1C}">
                 <a14:useLocalDpi xmlns:a14="http://schemas.microsoft.com/office/drawing/2010/main" val="0"/>
@@ -1928,7 +1958,7 @@
           <p:nvPr/>
         </p:nvPicPr>
         <p:blipFill rotWithShape="1">
-          <a:blip r:embed="rId3">
+          <a:blip r:embed="rId4">
             <a:extLst>
               <a:ext uri="{28A0092B-C50C-407E-A947-70E740481C1C}">
                 <a14:useLocalDpi xmlns:a14="http://schemas.microsoft.com/office/drawing/2010/main" val="0"/>
@@ -2111,7 +2141,15 @@
             </a:r>
             <a:r>
               <a:rPr lang="de-DE" sz="2400" i="1" dirty="0" smtClean="0"/>
-              <a:t>Temperatur. (links) und Feuchteprofil einer Radiosonde (rot) und 30 simulierten Einzelprofilen der ALPACAS (hellblau) sowie deren zeitliches Mittel (schwarz). Alle Profile stammen vom 29.8.2018 aus der Zeit zwischen 12:59 und 13:02 Uhr.</a:t>
+              <a:t>Temperatur. (links) und Feuchteprofil einer Radiosonde (rot) und 30 simulierten Einzelprofilen der ALPACAS </a:t>
+            </a:r>
+            <a:r>
+              <a:rPr lang="de-DE" sz="2400" i="1" dirty="0" smtClean="0"/>
+              <a:t>(farbig) </a:t>
+            </a:r>
+            <a:r>
+              <a:rPr lang="de-DE" sz="2400" i="1" dirty="0" smtClean="0"/>
+              <a:t>sowie deren zeitliches Mittel (schwarz). Alle Profile stammen vom 29.8.2018 aus der Zeit zwischen 12:59 Uhr  und 13:02 Uhr.</a:t>
             </a:r>
             <a:endParaRPr lang="de-DE" sz="2400" i="1" dirty="0"/>
           </a:p>
@@ -2187,7 +2225,7 @@
           <p:nvPr/>
         </p:nvPicPr>
         <p:blipFill>
-          <a:blip r:embed="rId4"/>
+          <a:blip r:embed="rId5"/>
           <a:stretch>
             <a:fillRect/>
           </a:stretch>
@@ -2211,7 +2249,7 @@
           <p:nvPr/>
         </p:nvPicPr>
         <p:blipFill>
-          <a:blip r:embed="rId5"/>
+          <a:blip r:embed="rId6"/>
           <a:stretch>
             <a:fillRect/>
           </a:stretch>
@@ -3168,7 +3206,7 @@
           <p:nvPr/>
         </p:nvPicPr>
         <p:blipFill>
-          <a:blip r:embed="rId6" cstate="email">
+          <a:blip r:embed="rId7" cstate="email">
             <a:extLst>
               <a:ext uri="{28A0092B-C50C-407E-A947-70E740481C1C}">
                 <a14:useLocalDpi xmlns:a14="http://schemas.microsoft.com/office/drawing/2010/main" val="0"/>
@@ -3198,7 +3236,7 @@
           <p:nvPr/>
         </p:nvPicPr>
         <p:blipFill>
-          <a:blip r:embed="rId7" cstate="email">
+          <a:blip r:embed="rId8" cstate="email">
             <a:extLst>
               <a:ext uri="{28A0092B-C50C-407E-A947-70E740481C1C}">
                 <a14:useLocalDpi xmlns:a14="http://schemas.microsoft.com/office/drawing/2010/main" val="0"/>
@@ -3336,7 +3374,7 @@
         <p:spPr>
           <a:xfrm>
             <a:off x="19443809" y="15202336"/>
-            <a:ext cx="1599270" cy="492443"/>
+            <a:ext cx="1860314" cy="646331"/>
           </a:xfrm>
           <a:prstGeom prst="rect">
             <a:avLst/>
@@ -3350,10 +3388,10 @@
           <a:lstStyle/>
           <a:p>
             <a:r>
-              <a:rPr lang="de-DE" dirty="0" err="1" smtClean="0"/>
+              <a:rPr lang="de-DE" sz="3600" dirty="0" err="1" smtClean="0"/>
               <a:t>Helikite</a:t>
             </a:r>
-            <a:endParaRPr lang="de-DE" dirty="0"/>
+            <a:endParaRPr lang="de-DE" sz="3600" dirty="0"/>
           </a:p>
         </p:txBody>
       </p:sp>
@@ -3365,8 +3403,8 @@
         </p:nvSpPr>
         <p:spPr>
           <a:xfrm>
-            <a:off x="24018102" y="15731355"/>
-            <a:ext cx="2461897" cy="492443"/>
+            <a:off x="23850574" y="15825948"/>
+            <a:ext cx="2629425" cy="646331"/>
           </a:xfrm>
           <a:prstGeom prst="rect">
             <a:avLst/>
@@ -3380,7 +3418,7 @@
           <a:lstStyle/>
           <a:p>
             <a:r>
-              <a:rPr lang="de-DE" dirty="0" smtClean="0"/>
+              <a:rPr lang="de-DE" sz="3600" dirty="0" smtClean="0"/>
               <a:t>Radiosonde</a:t>
             </a:r>
             <a:endParaRPr lang="de-DE" dirty="0"/>
@@ -3396,7 +3434,7 @@
         <p:spPr bwMode="auto">
           <a:xfrm>
             <a:off x="1220434" y="11362352"/>
-            <a:ext cx="26711150" cy="8138906"/>
+            <a:ext cx="27374834" cy="8138906"/>
           </a:xfrm>
           <a:prstGeom prst="rect">
             <a:avLst/>
@@ -3478,7 +3516,7 @@
         <p:spPr bwMode="auto">
           <a:xfrm>
             <a:off x="1220434" y="19804340"/>
-            <a:ext cx="26806603" cy="11649399"/>
+            <a:ext cx="27374834" cy="11649399"/>
           </a:xfrm>
           <a:prstGeom prst="rect">
             <a:avLst/>
@@ -3666,13 +3704,7 @@
               <a:rPr lang="de-DE" sz="4000" dirty="0" smtClean="0">
                 <a:ea typeface="ＭＳ Ｐゴシック" pitchFamily="124" charset="-128"/>
               </a:rPr>
-              <a:t> Da die Grenzschicht zeitlich und räumlich stark variabel ist, ist ein Einzelaufstieg meist nicht repräsentativ für den mittleren Zustand der Grenzschicht. </a:t>
-            </a:r>
-            <a:r>
-              <a:rPr lang="de-DE" sz="4000" dirty="0" smtClean="0">
-                <a:ea typeface="ＭＳ Ｐゴシック" pitchFamily="124" charset="-128"/>
-              </a:rPr>
-              <a:t>Aber wie gut repräsentiert ein Einzelaufstieg den </a:t>
+              <a:t> Da die Grenzschicht zeitlich und räumlich stark variabel ist, ist ein Einzelaufstieg meist nicht repräsentativ für den mittleren Zustand der Grenzschicht. Aber wie gut repräsentiert ein Einzelaufstieg den </a:t>
             </a:r>
             <a:r>
               <a:rPr lang="de-DE" sz="4000" dirty="0" err="1" smtClean="0">
@@ -3686,9 +3718,6 @@
               </a:rPr>
               <a:t> Zustand der Grenzschicht? Wie groß sind die </a:t>
             </a:r>
-            <a:endParaRPr lang="de-DE" sz="4000" dirty="0" smtClean="0">
-              <a:ea typeface="ＭＳ Ｐゴシック" pitchFamily="124" charset="-128"/>
-            </a:endParaRPr>
           </a:p>
         </p:txBody>
       </p:sp>
@@ -3727,19 +3756,7 @@
             <a:pPr algn="just"/>
             <a:r>
               <a:rPr lang="de-DE" sz="3600" dirty="0" smtClean="0"/>
-              <a:t>Zur Einschätzung der Variabilität </a:t>
-            </a:r>
-            <a:r>
-              <a:rPr lang="de-DE" sz="3600" dirty="0" smtClean="0"/>
-              <a:t>der Grenzschicht während eines Aufstieges wurde eine Messung einer Radiosonde mit gleichzeitigen kontinuierlichen Messungen der Grenzschicht verglichen. Die Messungen wurden am 29.8.2018 in Marienleuchte durchgeführt. </a:t>
-            </a:r>
-            <a:r>
-              <a:rPr lang="de-DE" sz="3600" dirty="0" smtClean="0"/>
-              <a:t>Um </a:t>
-            </a:r>
-            <a:r>
-              <a:rPr lang="de-DE" sz="3600" dirty="0" smtClean="0"/>
-              <a:t>die Temperatur und Feuchte in der Grenzschicht kontinuierlich zu messen, wurden elf ALPACAs an der Leine eines </a:t>
+              <a:t>Zur Einschätzung der Variabilität der Grenzschicht während eines Aufstieges wurde eine Messung einer Radiosonde mit gleichzeitigen kontinuierlichen Messungen der Grenzschicht verglichen. Die Messungen wurden am 29.8.2018 in Marienleuchte durchgeführt. Um die Temperatur und Feuchte in der Grenzschicht kontinuierlich zu messen, wurden elf ALPACAs an der Leine eines </a:t>
             </a:r>
             <a:r>
               <a:rPr lang="de-DE" sz="3600" dirty="0" err="1" smtClean="0"/>
@@ -3763,23 +3780,43 @@
             </a:r>
             <a:r>
               <a:rPr lang="de-DE" sz="3600" dirty="0" smtClean="0"/>
-              <a:t> (ca. 2-3 Minuten) wurde ein Ensemble von 30 </a:t>
+              <a:t> (ca. 2-3 Minuten) wurde ein Ensemble von </a:t>
+            </a:r>
+            <a:r>
+              <a:rPr lang="de-DE" sz="3600" dirty="0" smtClean="0"/>
+              <a:t>30 </a:t>
             </a:r>
             <a:r>
               <a:rPr lang="de-DE" sz="3600" dirty="0" err="1" smtClean="0"/>
-              <a:t>Radiosondenaufstiegen</a:t>
+              <a:t>instantanen</a:t>
             </a:r>
             <a:r>
               <a:rPr lang="de-DE" sz="3600" dirty="0" smtClean="0"/>
-              <a:t> simuliert. Anhand dieses Ensembles lässt sich bestimmen, wie stark Temperatur und Feuchte während des </a:t>
+              <a:t> </a:t>
+            </a:r>
+            <a:r>
+              <a:rPr lang="de-DE" sz="3600" dirty="0" smtClean="0"/>
+              <a:t>Einzelprofilen </a:t>
+            </a:r>
+            <a:r>
+              <a:rPr lang="de-DE" sz="3600" dirty="0" smtClean="0"/>
+              <a:t>simuliert</a:t>
+            </a:r>
+            <a:r>
+              <a:rPr lang="de-DE" sz="3600" dirty="0" smtClean="0"/>
+              <a:t>. Anhand dieses Ensembles lässt sich bestimmen, wie stark Temperatur und Feuchte während des </a:t>
             </a:r>
             <a:r>
               <a:rPr lang="de-DE" sz="3600" dirty="0" err="1" smtClean="0"/>
-              <a:t>Sondenaufstieges</a:t>
+              <a:t>Radiosondenaufstieges</a:t>
             </a:r>
             <a:r>
               <a:rPr lang="de-DE" sz="3600" dirty="0" smtClean="0"/>
-              <a:t> variieren.</a:t>
+              <a:t> variieren</a:t>
+            </a:r>
+            <a:r>
+              <a:rPr lang="de-DE" sz="3600" dirty="0" smtClean="0"/>
+              <a:t>.</a:t>
             </a:r>
           </a:p>
         </p:txBody>
@@ -3792,8 +3829,8 @@
         </p:nvSpPr>
         <p:spPr>
           <a:xfrm>
-            <a:off x="15510870" y="20342432"/>
-            <a:ext cx="12012111" cy="7632859"/>
+            <a:off x="14953044" y="20357754"/>
+            <a:ext cx="12809156" cy="11510843"/>
           </a:xfrm>
           <a:prstGeom prst="rect">
             <a:avLst/>
@@ -3814,36 +3851,29 @@
               </a:rPr>
               <a:t>Ergebnis</a:t>
             </a:r>
-            <a:endParaRPr lang="de-DE" sz="5400" b="1" dirty="0" smtClean="0">
-              <a:solidFill>
-                <a:srgbClr val="CB1028"/>
-              </a:solidFill>
-            </a:endParaRPr>
           </a:p>
           <a:p>
-            <a:pPr algn="just"/>
+            <a:pPr marL="571500" indent="-571500" algn="just">
+              <a:buFont typeface="Arial" charset="0"/>
+              <a:buChar char="•"/>
+            </a:pPr>
             <a:r>
               <a:rPr lang="de-DE" sz="3600" dirty="0" smtClean="0"/>
-              <a:t>Das gemessene Temperatur- und Feuchteprofil der Radiosonde deckt sich größtenteils mit den simulierten Ensembles (Abb. 1</a:t>
+              <a:t>Das </a:t>
             </a:r>
             <a:r>
               <a:rPr lang="de-DE" sz="3600" dirty="0" smtClean="0"/>
-              <a:t>). In etwa 400 m Höhe befindet sich die Oberkante einer Grenzschicht, die besonders am starken Gradienten der relativen Feuchte zu erkennen ist. </a:t>
+              <a:t>gemessene Temperatur- und Feuchteprofil der Radiosonde deckt sich größtenteils mit den simulierten Ensembles (Abb. 1). In etwa 400 m Höhe befindet sich die Oberkante einer Grenzschicht, die besonders am starken Gradienten der relativen Feuchte zu erkennen ist. </a:t>
             </a:r>
           </a:p>
           <a:p>
-            <a:pPr algn="just"/>
+            <a:pPr marL="571500" indent="-571500" algn="just">
+              <a:buFont typeface="Arial" charset="0"/>
+              <a:buChar char="•"/>
+            </a:pPr>
             <a:r>
               <a:rPr lang="de-DE" sz="3600" dirty="0" smtClean="0"/>
-              <a:t>Die </a:t>
-            </a:r>
-            <a:r>
-              <a:rPr lang="de-DE" sz="3600" dirty="0" smtClean="0"/>
-              <a:t>Temperatur variiert im Messzeitraum um bis zu 1 K, meist jedoch unter 0,5 K</a:t>
-            </a:r>
-            <a:r>
-              <a:rPr lang="de-DE" sz="3600" dirty="0" smtClean="0"/>
-              <a:t>. Die relative Feuchte variiert stärker, meist 3 </a:t>
+              <a:t>Die Temperatur variiert im Messzeitraum um bis zu 1 K, meist jedoch unter 0,5 K. Die relative Feuchte variiert stärker, meist 3 </a:t>
             </a:r>
             <a:r>
               <a:rPr lang="de-DE" sz="3600" dirty="0"/>
@@ -3851,12 +3881,23 @@
             </a:r>
             <a:r>
               <a:rPr lang="de-DE" sz="3600" dirty="0" smtClean="0"/>
-              <a:t> </a:t>
+              <a:t> 5 %. An der Oberkante der Grenzschicht variiert die Feuchte bis zu 10 </a:t>
             </a:r>
             <a:r>
               <a:rPr lang="de-DE" sz="3600" dirty="0" smtClean="0"/>
-              <a:t>5 %. An der Oberkante der Grenzschicht variiert die Feuchte bis zu 10 %. </a:t>
-            </a:r>
+              <a:t>%, da die Höhe der Oberkante innerhalb der Zeit stark schwankt.</a:t>
+            </a:r>
+          </a:p>
+          <a:p>
+            <a:pPr marL="571500" indent="-571500" algn="just">
+              <a:buFont typeface="Arial" charset="0"/>
+              <a:buChar char="•"/>
+            </a:pPr>
+            <a:r>
+              <a:rPr lang="de-DE" sz="3600" dirty="0" smtClean="0"/>
+              <a:t>Im unteren Bereich ähneln die Werte der Radiosonde den Einzelprofilen am Anfang des Aufstieges, und im  oberen Bereich denen am Ende des Aufstieges. Das Einzelprofil der Radiosonde setzt sich also aus verschiedenen Zuständen der Grenzschicht zusammen, die sich im oberen Bereich erheblich unterscheiden  </a:t>
+            </a:r>
+            <a:endParaRPr lang="de-DE" sz="3600" dirty="0" smtClean="0"/>
           </a:p>
           <a:p>
             <a:pPr algn="just"/>
@@ -3872,7 +3913,6 @@
               <a:rPr lang="de-DE" sz="4000" dirty="0" smtClean="0"/>
               <a:t> </a:t>
             </a:r>
-            <a:endParaRPr lang="de-DE" sz="4000" dirty="0" smtClean="0"/>
           </a:p>
         </p:txBody>
       </p:sp>
@@ -3885,7 +3925,7 @@
         <p:spPr bwMode="auto">
           <a:xfrm>
             <a:off x="1130049" y="31925640"/>
-            <a:ext cx="26896987" cy="3135632"/>
+            <a:ext cx="27465219" cy="3135632"/>
           </a:xfrm>
           <a:prstGeom prst="rect">
             <a:avLst/>
@@ -3943,17 +3983,6 @@
               </a:rPr>
               <a:t>Fazit</a:t>
             </a:r>
-            <a:endParaRPr kumimoji="0" lang="de-DE" sz="5400" b="1" i="0" u="none" strike="noStrike" cap="none" normalizeH="0" baseline="0" dirty="0" smtClean="0">
-              <a:ln>
-                <a:noFill/>
-              </a:ln>
-              <a:solidFill>
-                <a:srgbClr val="CB1028"/>
-              </a:solidFill>
-              <a:effectLst/>
-              <a:latin typeface="Arial" charset="0"/>
-              <a:ea typeface="ＭＳ Ｐゴシック" pitchFamily="124" charset="-128"/>
-            </a:endParaRPr>
           </a:p>
           <a:p>
             <a:pPr algn="just"/>
@@ -3985,11 +4014,8 @@
               <a:rPr lang="de-DE" sz="3600" dirty="0" smtClean="0">
                 <a:ea typeface="ＭＳ Ｐゴシック" pitchFamily="124" charset="-128"/>
               </a:rPr>
-              <a:t> nur geringfügig, während die Feuchte um bis zu 5 % vom mittleren Zustand der Grenzschicht abweichen kann.</a:t>
-            </a:r>
-            <a:endParaRPr lang="de-DE" sz="3600" dirty="0" smtClean="0">
-              <a:ea typeface="ＭＳ Ｐゴシック" pitchFamily="124" charset="-128"/>
-            </a:endParaRPr>
+              <a:t> nur geringfügig, während die Feuchte um bis zu 5 % vom mittleren Zustand der Grenzschicht abweichen kann!!!!!!1111ELF</a:t>
+            </a:r>
           </a:p>
         </p:txBody>
       </p:sp>
@@ -4054,17 +4080,6 @@
               </a:rPr>
               <a:t>Motivation</a:t>
             </a:r>
-            <a:endParaRPr kumimoji="0" lang="de-DE" sz="5400" b="1" i="0" u="none" strike="noStrike" cap="none" normalizeH="0" baseline="0" dirty="0" smtClean="0">
-              <a:ln>
-                <a:noFill/>
-              </a:ln>
-              <a:solidFill>
-                <a:srgbClr val="CB1028"/>
-              </a:solidFill>
-              <a:effectLst/>
-              <a:latin typeface="Arial" charset="0"/>
-              <a:ea typeface="ＭＳ Ｐゴシック" pitchFamily="124" charset="-128"/>
-            </a:endParaRPr>
           </a:p>
           <a:p>
             <a:pPr marL="0" marR="0" indent="0" algn="just" defTabSz="914400" rtl="0" eaLnBrk="0" fontAlgn="base" latinLnBrk="0" hangingPunct="0">
@@ -4113,13 +4128,7 @@
               <a:rPr lang="de-DE" sz="3600" i="1" dirty="0" smtClean="0">
                 <a:ea typeface="ＭＳ Ｐゴシック" pitchFamily="124" charset="-128"/>
               </a:rPr>
-              <a:t> Da die Grenzschicht zeitlich und räumlich stark variabel ist, ist ein Einzelaufstieg meist nicht repräsentativ für den mittleren Zustand der Grenzschicht. </a:t>
-            </a:r>
-            <a:r>
-              <a:rPr lang="de-DE" sz="3600" i="1" dirty="0" smtClean="0">
-                <a:ea typeface="ＭＳ Ｐゴシック" pitchFamily="124" charset="-128"/>
-              </a:rPr>
-              <a:t>Aber wie gut repräsentiert ein einzelner Aufstieg den </a:t>
+              <a:t> Da die Grenzschicht zeitlich und räumlich stark variabel ist, ist ein Einzelaufstieg meist nicht repräsentativ für den mittleren Zustand der Grenzschicht. Aber wie gut repräsentiert ein einzelner Aufstieg den </a:t>
             </a:r>
             <a:r>
               <a:rPr lang="de-DE" sz="3600" i="1" dirty="0" err="1" smtClean="0">
@@ -4133,22 +4142,49 @@
               </a:rPr>
               <a:t> Zustand der Grenzschicht? Wieviel Fehler entsteht dadurch, dass der Sensor nicht an einem Zeitpunkt die ganze Grenzschicht misst? Mit den kontinuierlichen Messungen der ALPACAS lassen sich diese Fragen beantworten.</a:t>
             </a:r>
-            <a:endParaRPr lang="de-DE" sz="3600" i="1" dirty="0" smtClean="0">
-              <a:ea typeface="ＭＳ Ｐゴシック" pitchFamily="124" charset="-128"/>
-            </a:endParaRPr>
+          </a:p>
+        </p:txBody>
+      </p:sp>
+      <p:sp>
+        <p:nvSpPr>
+          <p:cNvPr id="9" name="Textfeld 8"/>
+          <p:cNvSpPr txBox="1"/>
+          <p:nvPr/>
+        </p:nvSpPr>
+        <p:spPr>
+          <a:xfrm>
+            <a:off x="21341147" y="17690463"/>
+            <a:ext cx="4177490" cy="646331"/>
+          </a:xfrm>
+          <a:prstGeom prst="rect">
+            <a:avLst/>
+          </a:prstGeom>
+          <a:noFill/>
+        </p:spPr>
+        <p:txBody>
+          <a:bodyPr wrap="none" rtlCol="0">
+            <a:spAutoFit/>
+          </a:bodyPr>
+          <a:lstStyle/>
+          <a:p>
+            <a:r>
+              <a:rPr lang="de-DE" sz="3600" dirty="0" smtClean="0"/>
+              <a:t>Leine mit ALPACAs</a:t>
+            </a:r>
+            <a:endParaRPr lang="de-DE" sz="3600" dirty="0"/>
           </a:p>
         </p:txBody>
       </p:sp>
       <p:pic>
         <p:nvPicPr>
-          <p:cNvPr id="7" name="Bild 6"/>
+          <p:cNvPr id="13" name="Bild 12"/>
           <p:cNvPicPr>
             <a:picLocks noChangeAspect="1"/>
           </p:cNvPicPr>
           <p:nvPr/>
         </p:nvPicPr>
         <p:blipFill>
-          <a:blip r:embed="rId8">
+          <a:blip r:embed="rId9">
             <a:extLst>
               <a:ext uri="{28A0092B-C50C-407E-A947-70E740481C1C}">
                 <a14:useLocalDpi xmlns:a14="http://schemas.microsoft.com/office/drawing/2010/main" val="0"/>
@@ -4161,8 +4197,8 @@
         </p:blipFill>
         <p:spPr>
           <a:xfrm>
-            <a:off x="1745262" y="20244600"/>
-            <a:ext cx="12994866" cy="9096406"/>
+            <a:off x="12163093" y="38195834"/>
+            <a:ext cx="4866749" cy="3650290"/>
           </a:xfrm>
           <a:prstGeom prst="rect">
             <a:avLst/>

</xml_diff>

<commit_message>
Inserted new Alpaca Logo in Profilensemble poster
</commit_message>
<xml_diff>
--- a/poster/lex2018_poster_Profilensembles.pptx
+++ b/poster/lex2018_poster_Profilensembles.pptx
@@ -4177,7 +4177,7 @@
       </p:sp>
       <p:pic>
         <p:nvPicPr>
-          <p:cNvPr id="13" name="Bild 12"/>
+          <p:cNvPr id="16" name="Bild 15"/>
           <p:cNvPicPr>
             <a:picLocks noChangeAspect="1"/>
           </p:cNvPicPr>
@@ -4197,8 +4197,8 @@
         </p:blipFill>
         <p:spPr>
           <a:xfrm>
-            <a:off x="12163093" y="38195834"/>
-            <a:ext cx="4866749" cy="3650290"/>
+            <a:off x="12905358" y="37544733"/>
+            <a:ext cx="6997768" cy="4673896"/>
           </a:xfrm>
           <a:prstGeom prst="rect">
             <a:avLst/>

</xml_diff>